<commit_message>
matching GTDB tree to our sampled genomes; finding unsampled phyla
</commit_message>
<xml_diff>
--- a/flag/2025-02-19_CPL_mBio/motA_alignment.pptx
+++ b/flag/2025-02-19_CPL_mBio/motA_alignment.pptx
@@ -5,8 +5,9 @@
     <p:sldMasterId id="2147483648" r:id="rId1"/>
   </p:sldMasterIdLst>
   <p:sldIdLst>
-    <p:sldId id="256" r:id="rId2"/>
-    <p:sldId id="257" r:id="rId3"/>
+    <p:sldId id="258" r:id="rId2"/>
+    <p:sldId id="256" r:id="rId3"/>
+    <p:sldId id="257" r:id="rId4"/>
   </p:sldIdLst>
   <p:sldSz cx="12192000" cy="6858000"/>
   <p:notesSz cx="6858000" cy="9144000"/>
@@ -262,7 +263,7 @@
           <a:p>
             <a:fld id="{F752A7A6-A1F2-7644-9B1E-FD96CCFD0D39}" type="datetimeFigureOut">
               <a:rPr lang="en-US" smtClean="0"/>
-              <a:t>5/24/24</a:t>
+              <a:t>3/4/25</a:t>
             </a:fld>
             <a:endParaRPr lang="en-US"/>
           </a:p>
@@ -462,7 +463,7 @@
           <a:p>
             <a:fld id="{F752A7A6-A1F2-7644-9B1E-FD96CCFD0D39}" type="datetimeFigureOut">
               <a:rPr lang="en-US" smtClean="0"/>
-              <a:t>5/24/24</a:t>
+              <a:t>3/4/25</a:t>
             </a:fld>
             <a:endParaRPr lang="en-US"/>
           </a:p>
@@ -672,7 +673,7 @@
           <a:p>
             <a:fld id="{F752A7A6-A1F2-7644-9B1E-FD96CCFD0D39}" type="datetimeFigureOut">
               <a:rPr lang="en-US" smtClean="0"/>
-              <a:t>5/24/24</a:t>
+              <a:t>3/4/25</a:t>
             </a:fld>
             <a:endParaRPr lang="en-US"/>
           </a:p>
@@ -872,7 +873,7 @@
           <a:p>
             <a:fld id="{F752A7A6-A1F2-7644-9B1E-FD96CCFD0D39}" type="datetimeFigureOut">
               <a:rPr lang="en-US" smtClean="0"/>
-              <a:t>5/24/24</a:t>
+              <a:t>3/4/25</a:t>
             </a:fld>
             <a:endParaRPr lang="en-US"/>
           </a:p>
@@ -1148,7 +1149,7 @@
           <a:p>
             <a:fld id="{F752A7A6-A1F2-7644-9B1E-FD96CCFD0D39}" type="datetimeFigureOut">
               <a:rPr lang="en-US" smtClean="0"/>
-              <a:t>5/24/24</a:t>
+              <a:t>3/4/25</a:t>
             </a:fld>
             <a:endParaRPr lang="en-US"/>
           </a:p>
@@ -1416,7 +1417,7 @@
           <a:p>
             <a:fld id="{F752A7A6-A1F2-7644-9B1E-FD96CCFD0D39}" type="datetimeFigureOut">
               <a:rPr lang="en-US" smtClean="0"/>
-              <a:t>5/24/24</a:t>
+              <a:t>3/4/25</a:t>
             </a:fld>
             <a:endParaRPr lang="en-US"/>
           </a:p>
@@ -1831,7 +1832,7 @@
           <a:p>
             <a:fld id="{F752A7A6-A1F2-7644-9B1E-FD96CCFD0D39}" type="datetimeFigureOut">
               <a:rPr lang="en-US" smtClean="0"/>
-              <a:t>5/24/24</a:t>
+              <a:t>3/4/25</a:t>
             </a:fld>
             <a:endParaRPr lang="en-US"/>
           </a:p>
@@ -1973,7 +1974,7 @@
           <a:p>
             <a:fld id="{F752A7A6-A1F2-7644-9B1E-FD96CCFD0D39}" type="datetimeFigureOut">
               <a:rPr lang="en-US" smtClean="0"/>
-              <a:t>5/24/24</a:t>
+              <a:t>3/4/25</a:t>
             </a:fld>
             <a:endParaRPr lang="en-US"/>
           </a:p>
@@ -2086,7 +2087,7 @@
           <a:p>
             <a:fld id="{F752A7A6-A1F2-7644-9B1E-FD96CCFD0D39}" type="datetimeFigureOut">
               <a:rPr lang="en-US" smtClean="0"/>
-              <a:t>5/24/24</a:t>
+              <a:t>3/4/25</a:t>
             </a:fld>
             <a:endParaRPr lang="en-US"/>
           </a:p>
@@ -2399,7 +2400,7 @@
           <a:p>
             <a:fld id="{F752A7A6-A1F2-7644-9B1E-FD96CCFD0D39}" type="datetimeFigureOut">
               <a:rPr lang="en-US" smtClean="0"/>
-              <a:t>5/24/24</a:t>
+              <a:t>3/4/25</a:t>
             </a:fld>
             <a:endParaRPr lang="en-US"/>
           </a:p>
@@ -2688,7 +2689,7 @@
           <a:p>
             <a:fld id="{F752A7A6-A1F2-7644-9B1E-FD96CCFD0D39}" type="datetimeFigureOut">
               <a:rPr lang="en-US" smtClean="0"/>
-              <a:t>5/24/24</a:t>
+              <a:t>3/4/25</a:t>
             </a:fld>
             <a:endParaRPr lang="en-US"/>
           </a:p>
@@ -2931,7 +2932,7 @@
           <a:p>
             <a:fld id="{F752A7A6-A1F2-7644-9B1E-FD96CCFD0D39}" type="datetimeFigureOut">
               <a:rPr lang="en-US" smtClean="0"/>
-              <a:t>5/24/24</a:t>
+              <a:t>3/4/25</a:t>
             </a:fld>
             <a:endParaRPr lang="en-US"/>
           </a:p>
@@ -3348,162 +3349,26 @@
           <a:chExt cx="0" cy="0"/>
         </a:xfrm>
       </p:grpSpPr>
-      <p:pic>
-        <p:nvPicPr>
-          <p:cNvPr id="5" name="Picture 4" descr="A screen shot of a computer screen&#10;&#10;Description automatically generated">
-            <a:extLst>
-              <a:ext uri="{FF2B5EF4-FFF2-40B4-BE49-F238E27FC236}">
-                <a16:creationId xmlns:a16="http://schemas.microsoft.com/office/drawing/2014/main" id="{EEDADE76-E2AC-ED6A-A6EE-B6ABFD4C906B}"/>
-              </a:ext>
-            </a:extLst>
-          </p:cNvPr>
-          <p:cNvPicPr>
-            <a:picLocks noChangeAspect="1"/>
-          </p:cNvPicPr>
+      <p:sp>
+        <p:nvSpPr>
+          <p:cNvPr id="3" name="Rounded Rectangle 2">
+            <a:extLst>
+              <a:ext uri="{FF2B5EF4-FFF2-40B4-BE49-F238E27FC236}">
+                <a16:creationId xmlns:a16="http://schemas.microsoft.com/office/drawing/2014/main" id="{701F99E1-448D-54E1-6602-125A2EBA5FE3}"/>
+              </a:ext>
+            </a:extLst>
+          </p:cNvPr>
+          <p:cNvSpPr/>
           <p:nvPr/>
-        </p:nvPicPr>
-        <p:blipFill rotWithShape="1">
-          <a:blip r:embed="rId2"/>
-          <a:srcRect r="23589"/>
-          <a:stretch/>
-        </p:blipFill>
+        </p:nvSpPr>
         <p:spPr>
           <a:xfrm>
-            <a:off x="4278982" y="787400"/>
-            <a:ext cx="3609975" cy="5626100"/>
-          </a:xfrm>
-          <a:prstGeom prst="rect">
+            <a:off x="1935678" y="695185"/>
+            <a:ext cx="2631818" cy="1596753"/>
+          </a:xfrm>
+          <a:prstGeom prst="roundRect">
             <a:avLst/>
           </a:prstGeom>
-        </p:spPr>
-      </p:pic>
-      <p:sp>
-        <p:nvSpPr>
-          <p:cNvPr id="6" name="TextBox 5">
-            <a:extLst>
-              <a:ext uri="{FF2B5EF4-FFF2-40B4-BE49-F238E27FC236}">
-                <a16:creationId xmlns:a16="http://schemas.microsoft.com/office/drawing/2014/main" id="{C0DC1A5D-B6BE-A4CE-A1D2-1BA319AEB147}"/>
-              </a:ext>
-            </a:extLst>
-          </p:cNvPr>
-          <p:cNvSpPr txBox="1"/>
-          <p:nvPr/>
-        </p:nvSpPr>
-        <p:spPr>
-          <a:xfrm>
-            <a:off x="161995" y="3629"/>
-            <a:ext cx="3797969" cy="3139321"/>
-          </a:xfrm>
-          <a:prstGeom prst="rect">
-            <a:avLst/>
-          </a:prstGeom>
-          <a:noFill/>
-          <a:ln w="28575">
-            <a:solidFill>
-              <a:srgbClr val="FF0000"/>
-            </a:solidFill>
-          </a:ln>
-        </p:spPr>
-        <p:txBody>
-          <a:bodyPr wrap="square" rtlCol="0">
-            <a:spAutoFit/>
-          </a:bodyPr>
-          <a:lstStyle/>
-          <a:p>
-            <a:r>
-              <a:rPr lang="en-US" dirty="0"/>
-              <a:t>“FIT” or “FITO” (FIT=flagellar ion transporter oligomer)</a:t>
-            </a:r>
-            <a:br>
-              <a:rPr lang="en-US" dirty="0"/>
-            </a:br>
-            <a:r>
-              <a:rPr lang="en-US" dirty="0"/>
-              <a:t>Flagellar proteins: </a:t>
-            </a:r>
-            <a:r>
-              <a:rPr lang="en-US" dirty="0" err="1"/>
-              <a:t>motA</a:t>
-            </a:r>
-            <a:endParaRPr lang="en-US" dirty="0"/>
-          </a:p>
-          <a:p>
-            <a:endParaRPr lang="en-US" dirty="0"/>
-          </a:p>
-          <a:p>
-            <a:r>
-              <a:rPr lang="en-US" dirty="0"/>
-              <a:t>Other “MotAB” motors:</a:t>
-            </a:r>
-          </a:p>
-          <a:p>
-            <a:r>
-              <a:rPr lang="en-US" dirty="0" err="1"/>
-              <a:t>PomAB</a:t>
-            </a:r>
-            <a:r>
-              <a:rPr lang="en-US" dirty="0"/>
-              <a:t> (Polar motors, usually sodium/Na+ powered)</a:t>
-            </a:r>
-          </a:p>
-          <a:p>
-            <a:r>
-              <a:rPr lang="en-US" dirty="0" err="1"/>
-              <a:t>LafTU</a:t>
-            </a:r>
-            <a:r>
-              <a:rPr lang="en-US" dirty="0"/>
-              <a:t> (Lateral flagellar)</a:t>
-            </a:r>
-          </a:p>
-          <a:p>
-            <a:r>
-              <a:rPr lang="en-US" dirty="0" err="1"/>
-              <a:t>MotCD</a:t>
-            </a:r>
-            <a:endParaRPr lang="en-US" dirty="0"/>
-          </a:p>
-          <a:p>
-            <a:r>
-              <a:rPr lang="en-US" dirty="0" err="1"/>
-              <a:t>MotPS</a:t>
-            </a:r>
-            <a:r>
-              <a:rPr lang="en-US" dirty="0"/>
-              <a:t> (high PH motors I think)</a:t>
-            </a:r>
-          </a:p>
-          <a:p>
-            <a:endParaRPr lang="en-US" dirty="0"/>
-          </a:p>
-        </p:txBody>
-      </p:sp>
-      <p:sp>
-        <p:nvSpPr>
-          <p:cNvPr id="7" name="Rectangle 6">
-            <a:extLst>
-              <a:ext uri="{FF2B5EF4-FFF2-40B4-BE49-F238E27FC236}">
-                <a16:creationId xmlns:a16="http://schemas.microsoft.com/office/drawing/2014/main" id="{1ABF8D60-7F6D-4210-5B42-F29B6428A19F}"/>
-              </a:ext>
-            </a:extLst>
-          </p:cNvPr>
-          <p:cNvSpPr/>
-          <p:nvPr/>
-        </p:nvSpPr>
-        <p:spPr>
-          <a:xfrm>
-            <a:off x="4174958" y="685800"/>
-            <a:ext cx="3801980" cy="1660358"/>
-          </a:xfrm>
-          <a:prstGeom prst="rect">
-            <a:avLst/>
-          </a:prstGeom>
-          <a:noFill/>
-          <a:ln w="38100">
-            <a:solidFill>
-              <a:srgbClr val="FF0000"/>
-            </a:solidFill>
-          </a:ln>
         </p:spPr>
         <p:style>
           <a:lnRef idx="2">
@@ -3526,16 +3391,26 @@
           <a:lstStyle/>
           <a:p>
             <a:pPr algn="ctr"/>
-            <a:endParaRPr lang="en-US"/>
-          </a:p>
-        </p:txBody>
-      </p:sp>
-      <p:sp>
-        <p:nvSpPr>
-          <p:cNvPr id="8" name="Rectangle 7">
-            <a:extLst>
-              <a:ext uri="{FF2B5EF4-FFF2-40B4-BE49-F238E27FC236}">
-                <a16:creationId xmlns:a16="http://schemas.microsoft.com/office/drawing/2014/main" id="{5D24BF25-9F20-176E-3189-96A2499A091A}"/>
+            <a:r>
+              <a:rPr lang="en-US" dirty="0"/>
+              <a:t>193 genomes spanning bacterial diversity, yielding</a:t>
+            </a:r>
+          </a:p>
+          <a:p>
+            <a:pPr algn="ctr"/>
+            <a:r>
+              <a:rPr lang="en-US" dirty="0"/>
+              <a:t>379 homologs of MotAB/ExbBD/TolQR</a:t>
+            </a:r>
+          </a:p>
+        </p:txBody>
+      </p:sp>
+      <p:sp>
+        <p:nvSpPr>
+          <p:cNvPr id="6" name="Right Arrow 5">
+            <a:extLst>
+              <a:ext uri="{FF2B5EF4-FFF2-40B4-BE49-F238E27FC236}">
+                <a16:creationId xmlns:a16="http://schemas.microsoft.com/office/drawing/2014/main" id="{77B36104-A4FD-B5DB-C2FE-464AA0EE6B8F}"/>
               </a:ext>
             </a:extLst>
           </p:cNvPr>
@@ -3544,18 +3419,12 @@
         </p:nvSpPr>
         <p:spPr>
           <a:xfrm>
-            <a:off x="4278982" y="787400"/>
-            <a:ext cx="3609976" cy="560137"/>
-          </a:xfrm>
-          <a:prstGeom prst="rect">
+            <a:off x="4677748" y="970135"/>
+            <a:ext cx="915530" cy="1046852"/>
+          </a:xfrm>
+          <a:prstGeom prst="rightArrow">
             <a:avLst/>
           </a:prstGeom>
-          <a:noFill/>
-          <a:ln w="38100">
-            <a:solidFill>
-              <a:srgbClr val="FA04EF"/>
-            </a:solidFill>
-          </a:ln>
         </p:spPr>
         <p:style>
           <a:lnRef idx="2">
@@ -3584,203 +3453,24 @@
       </p:sp>
       <p:sp>
         <p:nvSpPr>
-          <p:cNvPr id="9" name="TextBox 8">
-            <a:extLst>
-              <a:ext uri="{FF2B5EF4-FFF2-40B4-BE49-F238E27FC236}">
-                <a16:creationId xmlns:a16="http://schemas.microsoft.com/office/drawing/2014/main" id="{BB346409-4280-9051-161D-A5B0906838B2}"/>
-              </a:ext>
-            </a:extLst>
-          </p:cNvPr>
-          <p:cNvSpPr txBox="1"/>
+          <p:cNvPr id="9" name="Rounded Rectangle 8">
+            <a:extLst>
+              <a:ext uri="{FF2B5EF4-FFF2-40B4-BE49-F238E27FC236}">
+                <a16:creationId xmlns:a16="http://schemas.microsoft.com/office/drawing/2014/main" id="{1AB6CAB2-EEC9-E5AE-5FC7-A5FB88BDC5B7}"/>
+              </a:ext>
+            </a:extLst>
+          </p:cNvPr>
+          <p:cNvSpPr/>
           <p:nvPr/>
         </p:nvSpPr>
         <p:spPr>
           <a:xfrm>
-            <a:off x="8493049" y="882802"/>
-            <a:ext cx="1250407" cy="369332"/>
-          </a:xfrm>
-          <a:prstGeom prst="rect">
+            <a:off x="5703530" y="695185"/>
+            <a:ext cx="2276689" cy="1596753"/>
+          </a:xfrm>
+          <a:prstGeom prst="roundRect">
             <a:avLst/>
           </a:prstGeom>
-          <a:noFill/>
-          <a:ln w="28575">
-            <a:solidFill>
-              <a:srgbClr val="FA04EF"/>
-            </a:solidFill>
-          </a:ln>
-        </p:spPr>
-        <p:txBody>
-          <a:bodyPr wrap="none" rtlCol="0">
-            <a:spAutoFit/>
-          </a:bodyPr>
-          <a:lstStyle/>
-          <a:p>
-            <a:r>
-              <a:rPr lang="en-US" dirty="0"/>
-              <a:t>TGI-5 </a:t>
-            </a:r>
-            <a:r>
-              <a:rPr lang="en-US" dirty="0" err="1"/>
-              <a:t>motA</a:t>
-            </a:r>
-            <a:endParaRPr lang="en-US" dirty="0"/>
-          </a:p>
-        </p:txBody>
-      </p:sp>
-      <p:cxnSp>
-        <p:nvCxnSpPr>
-          <p:cNvPr id="11" name="Straight Connector 10">
-            <a:extLst>
-              <a:ext uri="{FF2B5EF4-FFF2-40B4-BE49-F238E27FC236}">
-                <a16:creationId xmlns:a16="http://schemas.microsoft.com/office/drawing/2014/main" id="{D1D7E7AC-BBD7-7615-B75D-E1BAEF2C5EE5}"/>
-              </a:ext>
-            </a:extLst>
-          </p:cNvPr>
-          <p:cNvCxnSpPr>
-            <a:stCxn id="8" idx="3"/>
-            <a:endCxn id="9" idx="1"/>
-          </p:cNvCxnSpPr>
-          <p:nvPr/>
-        </p:nvCxnSpPr>
-        <p:spPr>
-          <a:xfrm flipV="1">
-            <a:off x="7888958" y="1067468"/>
-            <a:ext cx="604091" cy="1"/>
-          </a:xfrm>
-          <a:prstGeom prst="line">
-            <a:avLst/>
-          </a:prstGeom>
-          <a:ln w="57150">
-            <a:solidFill>
-              <a:srgbClr val="FA04EF"/>
-            </a:solidFill>
-          </a:ln>
-        </p:spPr>
-        <p:style>
-          <a:lnRef idx="1">
-            <a:schemeClr val="accent1"/>
-          </a:lnRef>
-          <a:fillRef idx="0">
-            <a:schemeClr val="accent1"/>
-          </a:fillRef>
-          <a:effectRef idx="0">
-            <a:schemeClr val="accent1"/>
-          </a:effectRef>
-          <a:fontRef idx="minor">
-            <a:schemeClr val="tx1"/>
-          </a:fontRef>
-        </p:style>
-      </p:cxnSp>
-      <p:cxnSp>
-        <p:nvCxnSpPr>
-          <p:cNvPr id="13" name="Straight Connector 12">
-            <a:extLst>
-              <a:ext uri="{FF2B5EF4-FFF2-40B4-BE49-F238E27FC236}">
-                <a16:creationId xmlns:a16="http://schemas.microsoft.com/office/drawing/2014/main" id="{ACB4563F-FB8F-0BE6-2DA7-50E4E838F4C4}"/>
-              </a:ext>
-            </a:extLst>
-          </p:cNvPr>
-          <p:cNvCxnSpPr>
-            <a:cxnSpLocks/>
-          </p:cNvCxnSpPr>
-          <p:nvPr/>
-        </p:nvCxnSpPr>
-        <p:spPr>
-          <a:xfrm flipV="1">
-            <a:off x="3959965" y="685800"/>
-            <a:ext cx="214993" cy="566334"/>
-          </a:xfrm>
-          <a:prstGeom prst="line">
-            <a:avLst/>
-          </a:prstGeom>
-          <a:ln w="38100">
-            <a:solidFill>
-              <a:srgbClr val="FF0000"/>
-            </a:solidFill>
-          </a:ln>
-        </p:spPr>
-        <p:style>
-          <a:lnRef idx="1">
-            <a:schemeClr val="accent1"/>
-          </a:lnRef>
-          <a:fillRef idx="0">
-            <a:schemeClr val="accent1"/>
-          </a:fillRef>
-          <a:effectRef idx="0">
-            <a:schemeClr val="accent1"/>
-          </a:effectRef>
-          <a:fontRef idx="minor">
-            <a:schemeClr val="tx1"/>
-          </a:fontRef>
-        </p:style>
-      </p:cxnSp>
-      <p:cxnSp>
-        <p:nvCxnSpPr>
-          <p:cNvPr id="15" name="Straight Connector 14">
-            <a:extLst>
-              <a:ext uri="{FF2B5EF4-FFF2-40B4-BE49-F238E27FC236}">
-                <a16:creationId xmlns:a16="http://schemas.microsoft.com/office/drawing/2014/main" id="{3A106FB7-9294-6240-04A0-A73D0081CB16}"/>
-              </a:ext>
-            </a:extLst>
-          </p:cNvPr>
-          <p:cNvCxnSpPr/>
-          <p:nvPr/>
-        </p:nvCxnSpPr>
-        <p:spPr>
-          <a:xfrm>
-            <a:off x="3959965" y="1621466"/>
-            <a:ext cx="214993" cy="724692"/>
-          </a:xfrm>
-          <a:prstGeom prst="line">
-            <a:avLst/>
-          </a:prstGeom>
-          <a:ln w="38100">
-            <a:solidFill>
-              <a:srgbClr val="FF0000"/>
-            </a:solidFill>
-          </a:ln>
-        </p:spPr>
-        <p:style>
-          <a:lnRef idx="1">
-            <a:schemeClr val="accent1"/>
-          </a:lnRef>
-          <a:fillRef idx="0">
-            <a:schemeClr val="accent1"/>
-          </a:fillRef>
-          <a:effectRef idx="0">
-            <a:schemeClr val="accent1"/>
-          </a:effectRef>
-          <a:fontRef idx="minor">
-            <a:schemeClr val="tx1"/>
-          </a:fontRef>
-        </p:style>
-      </p:cxnSp>
-      <p:sp>
-        <p:nvSpPr>
-          <p:cNvPr id="17" name="Rectangle 16">
-            <a:extLst>
-              <a:ext uri="{FF2B5EF4-FFF2-40B4-BE49-F238E27FC236}">
-                <a16:creationId xmlns:a16="http://schemas.microsoft.com/office/drawing/2014/main" id="{72F2E8B1-3855-15A3-38D6-5C99EA6988D3}"/>
-              </a:ext>
-            </a:extLst>
-          </p:cNvPr>
-          <p:cNvSpPr/>
-          <p:nvPr/>
-        </p:nvSpPr>
-        <p:spPr>
-          <a:xfrm>
-            <a:off x="4174958" y="2377240"/>
-            <a:ext cx="3801980" cy="4036260"/>
-          </a:xfrm>
-          <a:prstGeom prst="rect">
-            <a:avLst/>
-          </a:prstGeom>
-          <a:noFill/>
-          <a:ln w="38100">
-            <a:solidFill>
-              <a:srgbClr val="0EE0CE"/>
-            </a:solidFill>
-          </a:ln>
         </p:spPr>
         <p:style>
           <a:lnRef idx="2">
@@ -3803,16 +3493,62 @@
           <a:lstStyle/>
           <a:p>
             <a:pPr algn="ctr"/>
-            <a:endParaRPr lang="en-US"/>
-          </a:p>
-        </p:txBody>
-      </p:sp>
-      <p:sp>
-        <p:nvSpPr>
-          <p:cNvPr id="18" name="TextBox 17">
-            <a:extLst>
-              <a:ext uri="{FF2B5EF4-FFF2-40B4-BE49-F238E27FC236}">
-                <a16:creationId xmlns:a16="http://schemas.microsoft.com/office/drawing/2014/main" id="{B58F513E-012C-6705-DD27-DAE4B53152DF}"/>
+            <a:r>
+              <a:rPr lang="en-US" dirty="0"/>
+              <a:t>Beast2 tree distributions for:</a:t>
+            </a:r>
+          </a:p>
+          <a:p>
+            <a:pPr marL="285750" indent="-285750">
+              <a:buFont typeface="Arial" panose="020B0604020202020204" pitchFamily="34" charset="0"/>
+              <a:buChar char="•"/>
+            </a:pPr>
+            <a:r>
+              <a:rPr lang="en-US" dirty="0"/>
+              <a:t>MotA/ExbB/TolQ</a:t>
+            </a:r>
+          </a:p>
+          <a:p>
+            <a:pPr marL="285750" indent="-285750">
+              <a:buFont typeface="Arial" panose="020B0604020202020204" pitchFamily="34" charset="0"/>
+              <a:buChar char="•"/>
+            </a:pPr>
+            <a:r>
+              <a:rPr lang="en-US" dirty="0"/>
+              <a:t>MotB/</a:t>
+            </a:r>
+            <a:r>
+              <a:rPr lang="en-US" dirty="0" err="1"/>
+              <a:t>ExbD</a:t>
+            </a:r>
+            <a:r>
+              <a:rPr lang="en-US" dirty="0"/>
+              <a:t>/</a:t>
+            </a:r>
+            <a:r>
+              <a:rPr lang="en-US" dirty="0" err="1"/>
+              <a:t>TolR</a:t>
+            </a:r>
+            <a:endParaRPr lang="en-US" dirty="0"/>
+          </a:p>
+          <a:p>
+            <a:pPr marL="285750" indent="-285750">
+              <a:buFont typeface="Arial" panose="020B0604020202020204" pitchFamily="34" charset="0"/>
+              <a:buChar char="•"/>
+            </a:pPr>
+            <a:r>
+              <a:rPr lang="en-US" u="sng" dirty="0"/>
+              <a:t>Both together</a:t>
+            </a:r>
+          </a:p>
+        </p:txBody>
+      </p:sp>
+      <p:sp>
+        <p:nvSpPr>
+          <p:cNvPr id="10" name="TextBox 9">
+            <a:extLst>
+              <a:ext uri="{FF2B5EF4-FFF2-40B4-BE49-F238E27FC236}">
+                <a16:creationId xmlns:a16="http://schemas.microsoft.com/office/drawing/2014/main" id="{AD19F9B8-E4F5-976E-293D-1AC9CFE3A4C3}"/>
               </a:ext>
             </a:extLst>
           </p:cNvPr>
@@ -3821,208 +3557,33 @@
         </p:nvSpPr>
         <p:spPr>
           <a:xfrm>
-            <a:off x="69669" y="3067227"/>
-            <a:ext cx="3739164" cy="3693319"/>
+            <a:off x="795677" y="1308895"/>
+            <a:ext cx="933141" cy="307777"/>
           </a:xfrm>
           <a:prstGeom prst="rect">
             <a:avLst/>
           </a:prstGeom>
           <a:noFill/>
-          <a:ln w="28575">
-            <a:solidFill>
-              <a:srgbClr val="0EE0CE"/>
-            </a:solidFill>
-          </a:ln>
-        </p:spPr>
-        <p:txBody>
-          <a:bodyPr wrap="square" rtlCol="0">
+        </p:spPr>
+        <p:txBody>
+          <a:bodyPr wrap="none" rtlCol="0">
             <a:spAutoFit/>
           </a:bodyPr>
           <a:lstStyle/>
           <a:p>
             <a:r>
-              <a:rPr lang="en-US" dirty="0"/>
-              <a:t>”GIT” or “GITO” (General Ion transporter oligomer)</a:t>
-            </a:r>
-          </a:p>
-          <a:p>
-            <a:r>
-              <a:rPr lang="en-US" dirty="0"/>
-              <a:t>Or UNFIT: “(mostly) Uncharacterized Nonflagellar relatives of Flagellar Ion Transporters”</a:t>
-            </a:r>
-          </a:p>
-          <a:p>
-            <a:endParaRPr lang="en-US" dirty="0"/>
-          </a:p>
-          <a:p>
-            <a:r>
-              <a:rPr lang="en-US" dirty="0"/>
-              <a:t>Non-flagellar proteins: </a:t>
-            </a:r>
-          </a:p>
-          <a:p>
-            <a:r>
-              <a:rPr lang="en-US" dirty="0" err="1"/>
-              <a:t>ExbBD</a:t>
-            </a:r>
-            <a:r>
-              <a:rPr lang="en-US" dirty="0"/>
-              <a:t>, </a:t>
-            </a:r>
-            <a:r>
-              <a:rPr lang="en-US" dirty="0" err="1"/>
-              <a:t>TolQR</a:t>
-            </a:r>
-            <a:r>
-              <a:rPr lang="en-US" dirty="0"/>
-              <a:t> (ion transporters)</a:t>
-            </a:r>
-          </a:p>
-          <a:p>
-            <a:r>
-              <a:rPr lang="en-US" dirty="0" err="1"/>
-              <a:t>AglRS</a:t>
-            </a:r>
-            <a:r>
-              <a:rPr lang="en-US" dirty="0"/>
-              <a:t> (Adventitious Gliding in </a:t>
-            </a:r>
-            <a:r>
-              <a:rPr lang="en-US" i="1" dirty="0"/>
-              <a:t>Myxococcus</a:t>
-            </a:r>
-            <a:r>
-              <a:rPr lang="en-US" dirty="0"/>
-              <a:t>)</a:t>
-            </a:r>
-          </a:p>
-          <a:p>
-            <a:endParaRPr lang="en-US" dirty="0"/>
-          </a:p>
-          <a:p>
-            <a:r>
-              <a:rPr lang="en-US" dirty="0"/>
-              <a:t>AQB = Nick Matzke’s shorthand for “</a:t>
-            </a:r>
-            <a:r>
-              <a:rPr lang="en-US" dirty="0" err="1"/>
-              <a:t>MotA</a:t>
-            </a:r>
-            <a:r>
-              <a:rPr lang="en-US" dirty="0"/>
-              <a:t>/</a:t>
-            </a:r>
-            <a:r>
-              <a:rPr lang="en-US" dirty="0" err="1"/>
-              <a:t>TolQ</a:t>
-            </a:r>
-            <a:r>
-              <a:rPr lang="en-US" dirty="0"/>
-              <a:t>/</a:t>
-            </a:r>
-            <a:r>
-              <a:rPr lang="en-US" dirty="0" err="1"/>
-              <a:t>ExbB</a:t>
-            </a:r>
-            <a:r>
-              <a:rPr lang="en-US" dirty="0"/>
-              <a:t> superfamily”</a:t>
-            </a:r>
-          </a:p>
-        </p:txBody>
-      </p:sp>
-      <p:cxnSp>
-        <p:nvCxnSpPr>
-          <p:cNvPr id="19" name="Straight Connector 18">
-            <a:extLst>
-              <a:ext uri="{FF2B5EF4-FFF2-40B4-BE49-F238E27FC236}">
-                <a16:creationId xmlns:a16="http://schemas.microsoft.com/office/drawing/2014/main" id="{B8D30D82-A5B3-CC7C-B6AF-07E180DF2EE0}"/>
-              </a:ext>
-            </a:extLst>
-          </p:cNvPr>
-          <p:cNvCxnSpPr>
-            <a:cxnSpLocks/>
-          </p:cNvCxnSpPr>
-          <p:nvPr/>
-        </p:nvCxnSpPr>
-        <p:spPr>
-          <a:xfrm>
-            <a:off x="3808834" y="4903290"/>
-            <a:ext cx="366123" cy="1510210"/>
-          </a:xfrm>
-          <a:prstGeom prst="line">
-            <a:avLst/>
-          </a:prstGeom>
-          <a:ln w="38100">
-            <a:solidFill>
-              <a:srgbClr val="0EE0CE"/>
-            </a:solidFill>
-          </a:ln>
-        </p:spPr>
-        <p:style>
-          <a:lnRef idx="1">
-            <a:schemeClr val="accent1"/>
-          </a:lnRef>
-          <a:fillRef idx="0">
-            <a:schemeClr val="accent1"/>
-          </a:fillRef>
-          <a:effectRef idx="0">
-            <a:schemeClr val="accent1"/>
-          </a:effectRef>
-          <a:fontRef idx="minor">
-            <a:schemeClr val="tx1"/>
-          </a:fontRef>
-        </p:style>
-      </p:cxnSp>
-      <p:cxnSp>
-        <p:nvCxnSpPr>
-          <p:cNvPr id="21" name="Straight Connector 20">
-            <a:extLst>
-              <a:ext uri="{FF2B5EF4-FFF2-40B4-BE49-F238E27FC236}">
-                <a16:creationId xmlns:a16="http://schemas.microsoft.com/office/drawing/2014/main" id="{A656B789-9512-1AA9-880B-EDBC61702FF2}"/>
-              </a:ext>
-            </a:extLst>
-          </p:cNvPr>
-          <p:cNvCxnSpPr>
-            <a:cxnSpLocks/>
-          </p:cNvCxnSpPr>
-          <p:nvPr/>
-        </p:nvCxnSpPr>
-        <p:spPr>
-          <a:xfrm flipV="1">
-            <a:off x="3800457" y="2346158"/>
-            <a:ext cx="366479" cy="1925539"/>
-          </a:xfrm>
-          <a:prstGeom prst="line">
-            <a:avLst/>
-          </a:prstGeom>
-          <a:ln w="38100">
-            <a:solidFill>
-              <a:srgbClr val="0EE0CE"/>
-            </a:solidFill>
-          </a:ln>
-        </p:spPr>
-        <p:style>
-          <a:lnRef idx="1">
-            <a:schemeClr val="accent1"/>
-          </a:lnRef>
-          <a:fillRef idx="0">
-            <a:schemeClr val="accent1"/>
-          </a:fillRef>
-          <a:effectRef idx="0">
-            <a:schemeClr val="accent1"/>
-          </a:effectRef>
-          <a:fontRef idx="minor">
-            <a:schemeClr val="tx1"/>
-          </a:fontRef>
-        </p:style>
-      </p:cxnSp>
-      <p:sp>
-        <p:nvSpPr>
-          <p:cNvPr id="14" name="TextBox 13">
-            <a:extLst>
-              <a:ext uri="{FF2B5EF4-FFF2-40B4-BE49-F238E27FC236}">
-                <a16:creationId xmlns:a16="http://schemas.microsoft.com/office/drawing/2014/main" id="{5C5258CB-A938-5448-AC7B-22C248D59D80}"/>
+              <a:rPr lang="en-US" sz="1400" dirty="0"/>
+              <a:t>Phylogeny</a:t>
+            </a:r>
+          </a:p>
+        </p:txBody>
+      </p:sp>
+      <p:sp>
+        <p:nvSpPr>
+          <p:cNvPr id="11" name="TextBox 10">
+            <a:extLst>
+              <a:ext uri="{FF2B5EF4-FFF2-40B4-BE49-F238E27FC236}">
+                <a16:creationId xmlns:a16="http://schemas.microsoft.com/office/drawing/2014/main" id="{6B513A40-639D-EFF0-14B4-F827FC22C2D4}"/>
               </a:ext>
             </a:extLst>
           </p:cNvPr>
@@ -4031,18 +3592,703 @@
         </p:nvSpPr>
         <p:spPr>
           <a:xfrm>
-            <a:off x="8581029" y="1633802"/>
-            <a:ext cx="1250407" cy="369332"/>
+            <a:off x="715339" y="2798410"/>
+            <a:ext cx="1294410" cy="738664"/>
           </a:xfrm>
           <a:prstGeom prst="rect">
             <a:avLst/>
           </a:prstGeom>
           <a:noFill/>
-          <a:ln w="28575">
-            <a:solidFill>
-              <a:srgbClr val="FA04EF"/>
-            </a:solidFill>
-          </a:ln>
+        </p:spPr>
+        <p:txBody>
+          <a:bodyPr wrap="square" rtlCol="0">
+            <a:spAutoFit/>
+          </a:bodyPr>
+          <a:lstStyle/>
+          <a:p>
+            <a:pPr algn="ctr"/>
+            <a:r>
+              <a:rPr lang="en-US" sz="1400" dirty="0"/>
+              <a:t>Ancestral Sequence Reconstruction</a:t>
+            </a:r>
+          </a:p>
+        </p:txBody>
+      </p:sp>
+      <p:sp>
+        <p:nvSpPr>
+          <p:cNvPr id="12" name="Rounded Rectangle 11">
+            <a:extLst>
+              <a:ext uri="{FF2B5EF4-FFF2-40B4-BE49-F238E27FC236}">
+                <a16:creationId xmlns:a16="http://schemas.microsoft.com/office/drawing/2014/main" id="{6A68FDDA-746E-1EF6-72F6-551EC9EA6C24}"/>
+              </a:ext>
+            </a:extLst>
+          </p:cNvPr>
+          <p:cNvSpPr/>
+          <p:nvPr/>
+        </p:nvSpPr>
+        <p:spPr>
+          <a:xfrm>
+            <a:off x="1930561" y="2690689"/>
+            <a:ext cx="2631818" cy="954107"/>
+          </a:xfrm>
+          <a:prstGeom prst="roundRect">
+            <a:avLst/>
+          </a:prstGeom>
+        </p:spPr>
+        <p:style>
+          <a:lnRef idx="2">
+            <a:schemeClr val="accent1">
+              <a:shade val="15000"/>
+            </a:schemeClr>
+          </a:lnRef>
+          <a:fillRef idx="1">
+            <a:schemeClr val="accent1"/>
+          </a:fillRef>
+          <a:effectRef idx="0">
+            <a:schemeClr val="accent1"/>
+          </a:effectRef>
+          <a:fontRef idx="minor">
+            <a:schemeClr val="lt1"/>
+          </a:fontRef>
+        </p:style>
+        <p:txBody>
+          <a:bodyPr rtlCol="0" anchor="ctr"/>
+          <a:lstStyle/>
+          <a:p>
+            <a:pPr algn="ctr"/>
+            <a:r>
+              <a:rPr lang="en-US" dirty="0"/>
+              <a:t>PAML: reconstruct ancestral sequences and gaps</a:t>
+            </a:r>
+          </a:p>
+        </p:txBody>
+      </p:sp>
+      <p:sp>
+        <p:nvSpPr>
+          <p:cNvPr id="13" name="Right Arrow 12">
+            <a:extLst>
+              <a:ext uri="{FF2B5EF4-FFF2-40B4-BE49-F238E27FC236}">
+                <a16:creationId xmlns:a16="http://schemas.microsoft.com/office/drawing/2014/main" id="{585B134C-4392-4A02-2059-58927E7476CF}"/>
+              </a:ext>
+            </a:extLst>
+          </p:cNvPr>
+          <p:cNvSpPr/>
+          <p:nvPr/>
+        </p:nvSpPr>
+        <p:spPr>
+          <a:xfrm>
+            <a:off x="4683093" y="2882973"/>
+            <a:ext cx="910185" cy="569537"/>
+          </a:xfrm>
+          <a:prstGeom prst="rightArrow">
+            <a:avLst/>
+          </a:prstGeom>
+        </p:spPr>
+        <p:style>
+          <a:lnRef idx="2">
+            <a:schemeClr val="accent1">
+              <a:shade val="15000"/>
+            </a:schemeClr>
+          </a:lnRef>
+          <a:fillRef idx="1">
+            <a:schemeClr val="accent1"/>
+          </a:fillRef>
+          <a:effectRef idx="0">
+            <a:schemeClr val="accent1"/>
+          </a:effectRef>
+          <a:fontRef idx="minor">
+            <a:schemeClr val="lt1"/>
+          </a:fontRef>
+        </p:style>
+        <p:txBody>
+          <a:bodyPr rtlCol="0" anchor="ctr"/>
+          <a:lstStyle/>
+          <a:p>
+            <a:pPr algn="ctr"/>
+            <a:endParaRPr lang="en-US"/>
+          </a:p>
+        </p:txBody>
+      </p:sp>
+      <p:sp>
+        <p:nvSpPr>
+          <p:cNvPr id="14" name="Right Arrow 13">
+            <a:extLst>
+              <a:ext uri="{FF2B5EF4-FFF2-40B4-BE49-F238E27FC236}">
+                <a16:creationId xmlns:a16="http://schemas.microsoft.com/office/drawing/2014/main" id="{B7D9D89D-A7CF-3174-2920-13D51F65CEC8}"/>
+              </a:ext>
+            </a:extLst>
+          </p:cNvPr>
+          <p:cNvSpPr/>
+          <p:nvPr/>
+        </p:nvSpPr>
+        <p:spPr>
+          <a:xfrm rot="9176887">
+            <a:off x="4406397" y="2415423"/>
+            <a:ext cx="1812281" cy="249980"/>
+          </a:xfrm>
+          <a:prstGeom prst="rightArrow">
+            <a:avLst/>
+          </a:prstGeom>
+        </p:spPr>
+        <p:style>
+          <a:lnRef idx="2">
+            <a:schemeClr val="accent1">
+              <a:shade val="15000"/>
+            </a:schemeClr>
+          </a:lnRef>
+          <a:fillRef idx="1">
+            <a:schemeClr val="accent1"/>
+          </a:fillRef>
+          <a:effectRef idx="0">
+            <a:schemeClr val="accent1"/>
+          </a:effectRef>
+          <a:fontRef idx="minor">
+            <a:schemeClr val="lt1"/>
+          </a:fontRef>
+        </p:style>
+        <p:txBody>
+          <a:bodyPr rtlCol="0" anchor="ctr"/>
+          <a:lstStyle/>
+          <a:p>
+            <a:pPr algn="ctr"/>
+            <a:endParaRPr lang="en-US"/>
+          </a:p>
+        </p:txBody>
+      </p:sp>
+      <p:sp>
+        <p:nvSpPr>
+          <p:cNvPr id="15" name="Rounded Rectangle 14">
+            <a:extLst>
+              <a:ext uri="{FF2B5EF4-FFF2-40B4-BE49-F238E27FC236}">
+                <a16:creationId xmlns:a16="http://schemas.microsoft.com/office/drawing/2014/main" id="{D05C9A1D-720A-9E04-4944-745DDE5A2E5A}"/>
+              </a:ext>
+            </a:extLst>
+          </p:cNvPr>
+          <p:cNvSpPr/>
+          <p:nvPr/>
+        </p:nvSpPr>
+        <p:spPr>
+          <a:xfrm>
+            <a:off x="5731854" y="2770493"/>
+            <a:ext cx="2248365" cy="874303"/>
+          </a:xfrm>
+          <a:prstGeom prst="roundRect">
+            <a:avLst/>
+          </a:prstGeom>
+        </p:spPr>
+        <p:style>
+          <a:lnRef idx="2">
+            <a:schemeClr val="accent1">
+              <a:shade val="15000"/>
+            </a:schemeClr>
+          </a:lnRef>
+          <a:fillRef idx="1">
+            <a:schemeClr val="accent1"/>
+          </a:fillRef>
+          <a:effectRef idx="0">
+            <a:schemeClr val="accent1"/>
+          </a:effectRef>
+          <a:fontRef idx="minor">
+            <a:schemeClr val="lt1"/>
+          </a:fontRef>
+        </p:style>
+        <p:txBody>
+          <a:bodyPr rtlCol="0" anchor="ctr"/>
+          <a:lstStyle/>
+          <a:p>
+            <a:pPr algn="ctr"/>
+            <a:r>
+              <a:rPr lang="en-US" dirty="0"/>
+              <a:t>AlphaFold structure reconstructions</a:t>
+            </a:r>
+          </a:p>
+        </p:txBody>
+      </p:sp>
+      <p:sp>
+        <p:nvSpPr>
+          <p:cNvPr id="16" name="Right Arrow 15">
+            <a:extLst>
+              <a:ext uri="{FF2B5EF4-FFF2-40B4-BE49-F238E27FC236}">
+                <a16:creationId xmlns:a16="http://schemas.microsoft.com/office/drawing/2014/main" id="{8E34F239-2599-0651-E611-C2DF6C1B4936}"/>
+              </a:ext>
+            </a:extLst>
+          </p:cNvPr>
+          <p:cNvSpPr/>
+          <p:nvPr/>
+        </p:nvSpPr>
+        <p:spPr>
+          <a:xfrm rot="5400000">
+            <a:off x="2994301" y="2121544"/>
+            <a:ext cx="569539" cy="739538"/>
+          </a:xfrm>
+          <a:prstGeom prst="rightArrow">
+            <a:avLst>
+              <a:gd name="adj1" fmla="val 50000"/>
+              <a:gd name="adj2" fmla="val 47915"/>
+            </a:avLst>
+          </a:prstGeom>
+        </p:spPr>
+        <p:style>
+          <a:lnRef idx="2">
+            <a:schemeClr val="accent1">
+              <a:shade val="15000"/>
+            </a:schemeClr>
+          </a:lnRef>
+          <a:fillRef idx="1">
+            <a:schemeClr val="accent1"/>
+          </a:fillRef>
+          <a:effectRef idx="0">
+            <a:schemeClr val="accent1"/>
+          </a:effectRef>
+          <a:fontRef idx="minor">
+            <a:schemeClr val="lt1"/>
+          </a:fontRef>
+        </p:style>
+        <p:txBody>
+          <a:bodyPr rtlCol="0" anchor="ctr"/>
+          <a:lstStyle/>
+          <a:p>
+            <a:pPr algn="ctr"/>
+            <a:endParaRPr lang="en-US"/>
+          </a:p>
+        </p:txBody>
+      </p:sp>
+      <p:sp>
+        <p:nvSpPr>
+          <p:cNvPr id="19" name="Bent Arrow 18">
+            <a:extLst>
+              <a:ext uri="{FF2B5EF4-FFF2-40B4-BE49-F238E27FC236}">
+                <a16:creationId xmlns:a16="http://schemas.microsoft.com/office/drawing/2014/main" id="{5F4D941B-6C9B-C287-0C81-E9BD7595240C}"/>
+              </a:ext>
+            </a:extLst>
+          </p:cNvPr>
+          <p:cNvSpPr/>
+          <p:nvPr/>
+        </p:nvSpPr>
+        <p:spPr>
+          <a:xfrm rot="8578701">
+            <a:off x="7377355" y="2489314"/>
+            <a:ext cx="1466081" cy="1617875"/>
+          </a:xfrm>
+          <a:prstGeom prst="bentArrow">
+            <a:avLst>
+              <a:gd name="adj1" fmla="val 13084"/>
+              <a:gd name="adj2" fmla="val 14290"/>
+              <a:gd name="adj3" fmla="val 25000"/>
+              <a:gd name="adj4" fmla="val 75000"/>
+            </a:avLst>
+          </a:prstGeom>
+        </p:spPr>
+        <p:style>
+          <a:lnRef idx="2">
+            <a:schemeClr val="accent1">
+              <a:shade val="15000"/>
+            </a:schemeClr>
+          </a:lnRef>
+          <a:fillRef idx="1">
+            <a:schemeClr val="accent1"/>
+          </a:fillRef>
+          <a:effectRef idx="0">
+            <a:schemeClr val="accent1"/>
+          </a:effectRef>
+          <a:fontRef idx="minor">
+            <a:schemeClr val="lt1"/>
+          </a:fontRef>
+        </p:style>
+        <p:txBody>
+          <a:bodyPr rtlCol="0" anchor="ctr"/>
+          <a:lstStyle/>
+          <a:p>
+            <a:pPr algn="ctr"/>
+            <a:endParaRPr lang="en-US">
+              <a:solidFill>
+                <a:schemeClr val="tx1"/>
+              </a:solidFill>
+            </a:endParaRPr>
+          </a:p>
+        </p:txBody>
+      </p:sp>
+      <p:sp>
+        <p:nvSpPr>
+          <p:cNvPr id="21" name="Rounded Rectangle 20">
+            <a:extLst>
+              <a:ext uri="{FF2B5EF4-FFF2-40B4-BE49-F238E27FC236}">
+                <a16:creationId xmlns:a16="http://schemas.microsoft.com/office/drawing/2014/main" id="{5C9084D1-A6D6-1D7B-E08A-117BA16A7C89}"/>
+              </a:ext>
+            </a:extLst>
+          </p:cNvPr>
+          <p:cNvSpPr/>
+          <p:nvPr/>
+        </p:nvSpPr>
+        <p:spPr>
+          <a:xfrm>
+            <a:off x="5731854" y="4043688"/>
+            <a:ext cx="2192575" cy="1220283"/>
+          </a:xfrm>
+          <a:prstGeom prst="roundRect">
+            <a:avLst/>
+          </a:prstGeom>
+        </p:spPr>
+        <p:style>
+          <a:lnRef idx="2">
+            <a:schemeClr val="accent1">
+              <a:shade val="15000"/>
+            </a:schemeClr>
+          </a:lnRef>
+          <a:fillRef idx="1">
+            <a:schemeClr val="accent1"/>
+          </a:fillRef>
+          <a:effectRef idx="0">
+            <a:schemeClr val="accent1"/>
+          </a:effectRef>
+          <a:fontRef idx="minor">
+            <a:schemeClr val="lt1"/>
+          </a:fontRef>
+        </p:style>
+        <p:txBody>
+          <a:bodyPr rtlCol="0" anchor="ctr"/>
+          <a:lstStyle/>
+          <a:p>
+            <a:pPr algn="ctr"/>
+            <a:r>
+              <a:rPr lang="en-US" sz="1400" dirty="0"/>
+              <a:t>Quantification of structural diversity, phylogenetic mapping of major conserved structural variations</a:t>
+            </a:r>
+          </a:p>
+        </p:txBody>
+      </p:sp>
+      <p:sp>
+        <p:nvSpPr>
+          <p:cNvPr id="22" name="Right Arrow 21">
+            <a:extLst>
+              <a:ext uri="{FF2B5EF4-FFF2-40B4-BE49-F238E27FC236}">
+                <a16:creationId xmlns:a16="http://schemas.microsoft.com/office/drawing/2014/main" id="{540B7BF8-D521-CC87-CEB7-921229409446}"/>
+              </a:ext>
+            </a:extLst>
+          </p:cNvPr>
+          <p:cNvSpPr/>
+          <p:nvPr/>
+        </p:nvSpPr>
+        <p:spPr>
+          <a:xfrm rot="10800000">
+            <a:off x="4717878" y="4199173"/>
+            <a:ext cx="910184" cy="862447"/>
+          </a:xfrm>
+          <a:prstGeom prst="rightArrow">
+            <a:avLst/>
+          </a:prstGeom>
+        </p:spPr>
+        <p:style>
+          <a:lnRef idx="2">
+            <a:schemeClr val="accent1">
+              <a:shade val="15000"/>
+            </a:schemeClr>
+          </a:lnRef>
+          <a:fillRef idx="1">
+            <a:schemeClr val="accent1"/>
+          </a:fillRef>
+          <a:effectRef idx="0">
+            <a:schemeClr val="accent1"/>
+          </a:effectRef>
+          <a:fontRef idx="minor">
+            <a:schemeClr val="lt1"/>
+          </a:fontRef>
+        </p:style>
+        <p:txBody>
+          <a:bodyPr rtlCol="0" anchor="ctr"/>
+          <a:lstStyle/>
+          <a:p>
+            <a:pPr algn="ctr"/>
+            <a:endParaRPr lang="en-US"/>
+          </a:p>
+        </p:txBody>
+      </p:sp>
+      <p:sp>
+        <p:nvSpPr>
+          <p:cNvPr id="23" name="Rounded Rectangle 22">
+            <a:extLst>
+              <a:ext uri="{FF2B5EF4-FFF2-40B4-BE49-F238E27FC236}">
+                <a16:creationId xmlns:a16="http://schemas.microsoft.com/office/drawing/2014/main" id="{16BD4A73-115D-AC8F-1309-95621EDF518E}"/>
+              </a:ext>
+            </a:extLst>
+          </p:cNvPr>
+          <p:cNvSpPr/>
+          <p:nvPr/>
+        </p:nvSpPr>
+        <p:spPr>
+          <a:xfrm>
+            <a:off x="1964411" y="4016772"/>
+            <a:ext cx="2680507" cy="1220283"/>
+          </a:xfrm>
+          <a:prstGeom prst="roundRect">
+            <a:avLst/>
+          </a:prstGeom>
+        </p:spPr>
+        <p:style>
+          <a:lnRef idx="2">
+            <a:schemeClr val="accent1">
+              <a:shade val="15000"/>
+            </a:schemeClr>
+          </a:lnRef>
+          <a:fillRef idx="1">
+            <a:schemeClr val="accent1"/>
+          </a:fillRef>
+          <a:effectRef idx="0">
+            <a:schemeClr val="accent1"/>
+          </a:effectRef>
+          <a:fontRef idx="minor">
+            <a:schemeClr val="lt1"/>
+          </a:fontRef>
+        </p:style>
+        <p:txBody>
+          <a:bodyPr rtlCol="0" anchor="ctr"/>
+          <a:lstStyle/>
+          <a:p>
+            <a:pPr algn="ctr"/>
+            <a:r>
+              <a:rPr lang="en-US" dirty="0"/>
+              <a:t>Classification of MotAB/ExbBD/TolQR into: GIT (CCD2, CCD3), FIT (TGI4, TGI5) </a:t>
+            </a:r>
+          </a:p>
+        </p:txBody>
+      </p:sp>
+      <p:sp>
+        <p:nvSpPr>
+          <p:cNvPr id="20" name="Right Arrow 19">
+            <a:extLst>
+              <a:ext uri="{FF2B5EF4-FFF2-40B4-BE49-F238E27FC236}">
+                <a16:creationId xmlns:a16="http://schemas.microsoft.com/office/drawing/2014/main" id="{AF4C99E4-CD3D-F815-8025-D45D695E18AF}"/>
+              </a:ext>
+            </a:extLst>
+          </p:cNvPr>
+          <p:cNvSpPr/>
+          <p:nvPr/>
+        </p:nvSpPr>
+        <p:spPr>
+          <a:xfrm rot="5400000">
+            <a:off x="6595003" y="3468813"/>
+            <a:ext cx="569539" cy="739538"/>
+          </a:xfrm>
+          <a:prstGeom prst="rightArrow">
+            <a:avLst>
+              <a:gd name="adj1" fmla="val 50000"/>
+              <a:gd name="adj2" fmla="val 47915"/>
+            </a:avLst>
+          </a:prstGeom>
+        </p:spPr>
+        <p:style>
+          <a:lnRef idx="2">
+            <a:schemeClr val="accent1">
+              <a:shade val="15000"/>
+            </a:schemeClr>
+          </a:lnRef>
+          <a:fillRef idx="1">
+            <a:schemeClr val="accent1"/>
+          </a:fillRef>
+          <a:effectRef idx="0">
+            <a:schemeClr val="accent1"/>
+          </a:effectRef>
+          <a:fontRef idx="minor">
+            <a:schemeClr val="lt1"/>
+          </a:fontRef>
+        </p:style>
+        <p:txBody>
+          <a:bodyPr rtlCol="0" anchor="ctr"/>
+          <a:lstStyle/>
+          <a:p>
+            <a:pPr algn="ctr"/>
+            <a:endParaRPr lang="en-US"/>
+          </a:p>
+        </p:txBody>
+      </p:sp>
+      <p:sp>
+        <p:nvSpPr>
+          <p:cNvPr id="26" name="Rounded Rectangle 25">
+            <a:extLst>
+              <a:ext uri="{FF2B5EF4-FFF2-40B4-BE49-F238E27FC236}">
+                <a16:creationId xmlns:a16="http://schemas.microsoft.com/office/drawing/2014/main" id="{019972EB-D0EC-F3E4-B9AC-49312D2E6C9F}"/>
+              </a:ext>
+            </a:extLst>
+          </p:cNvPr>
+          <p:cNvSpPr/>
+          <p:nvPr/>
+        </p:nvSpPr>
+        <p:spPr>
+          <a:xfrm>
+            <a:off x="2779030" y="5365351"/>
+            <a:ext cx="2533507" cy="1080793"/>
+          </a:xfrm>
+          <a:prstGeom prst="roundRect">
+            <a:avLst/>
+          </a:prstGeom>
+        </p:spPr>
+        <p:style>
+          <a:lnRef idx="2">
+            <a:schemeClr val="accent1">
+              <a:shade val="15000"/>
+            </a:schemeClr>
+          </a:lnRef>
+          <a:fillRef idx="1">
+            <a:schemeClr val="accent1"/>
+          </a:fillRef>
+          <a:effectRef idx="0">
+            <a:schemeClr val="accent1"/>
+          </a:effectRef>
+          <a:fontRef idx="minor">
+            <a:schemeClr val="lt1"/>
+          </a:fontRef>
+        </p:style>
+        <p:txBody>
+          <a:bodyPr rtlCol="0" anchor="ctr"/>
+          <a:lstStyle/>
+          <a:p>
+            <a:pPr algn="ctr"/>
+            <a:r>
+              <a:rPr lang="en-US" sz="1600" dirty="0"/>
+              <a:t>Experiment: removing TGI5-specific structural element abolishes motility</a:t>
+            </a:r>
+          </a:p>
+        </p:txBody>
+      </p:sp>
+      <p:sp>
+        <p:nvSpPr>
+          <p:cNvPr id="25" name="Right Arrow 24">
+            <a:extLst>
+              <a:ext uri="{FF2B5EF4-FFF2-40B4-BE49-F238E27FC236}">
+                <a16:creationId xmlns:a16="http://schemas.microsoft.com/office/drawing/2014/main" id="{A4F7B011-73C4-E906-C3C4-5FDDE0DCADF1}"/>
+              </a:ext>
+            </a:extLst>
+          </p:cNvPr>
+          <p:cNvSpPr/>
+          <p:nvPr/>
+        </p:nvSpPr>
+        <p:spPr>
+          <a:xfrm rot="9176887">
+            <a:off x="5179709" y="5165679"/>
+            <a:ext cx="688640" cy="325068"/>
+          </a:xfrm>
+          <a:prstGeom prst="rightArrow">
+            <a:avLst/>
+          </a:prstGeom>
+        </p:spPr>
+        <p:style>
+          <a:lnRef idx="2">
+            <a:schemeClr val="accent1">
+              <a:shade val="15000"/>
+            </a:schemeClr>
+          </a:lnRef>
+          <a:fillRef idx="1">
+            <a:schemeClr val="accent1"/>
+          </a:fillRef>
+          <a:effectRef idx="0">
+            <a:schemeClr val="accent1"/>
+          </a:effectRef>
+          <a:fontRef idx="minor">
+            <a:schemeClr val="lt1"/>
+          </a:fontRef>
+        </p:style>
+        <p:txBody>
+          <a:bodyPr rtlCol="0" anchor="ctr"/>
+          <a:lstStyle/>
+          <a:p>
+            <a:pPr algn="ctr"/>
+            <a:endParaRPr lang="en-US"/>
+          </a:p>
+        </p:txBody>
+      </p:sp>
+      <p:sp>
+        <p:nvSpPr>
+          <p:cNvPr id="27" name="TextBox 26">
+            <a:extLst>
+              <a:ext uri="{FF2B5EF4-FFF2-40B4-BE49-F238E27FC236}">
+                <a16:creationId xmlns:a16="http://schemas.microsoft.com/office/drawing/2014/main" id="{FE3D6E0F-EEE0-71F5-9986-EE92C71FE318}"/>
+              </a:ext>
+            </a:extLst>
+          </p:cNvPr>
+          <p:cNvSpPr txBox="1"/>
+          <p:nvPr/>
+        </p:nvSpPr>
+        <p:spPr>
+          <a:xfrm>
+            <a:off x="715339" y="4228397"/>
+            <a:ext cx="1294410" cy="738664"/>
+          </a:xfrm>
+          <a:prstGeom prst="rect">
+            <a:avLst/>
+          </a:prstGeom>
+          <a:noFill/>
+        </p:spPr>
+        <p:txBody>
+          <a:bodyPr wrap="square" rtlCol="0">
+            <a:spAutoFit/>
+          </a:bodyPr>
+          <a:lstStyle/>
+          <a:p>
+            <a:pPr algn="ctr"/>
+            <a:r>
+              <a:rPr lang="en-US" sz="1400" dirty="0"/>
+              <a:t>Ancestral Structure Reconstruction</a:t>
+            </a:r>
+          </a:p>
+        </p:txBody>
+      </p:sp>
+      <p:sp>
+        <p:nvSpPr>
+          <p:cNvPr id="28" name="TextBox 27">
+            <a:extLst>
+              <a:ext uri="{FF2B5EF4-FFF2-40B4-BE49-F238E27FC236}">
+                <a16:creationId xmlns:a16="http://schemas.microsoft.com/office/drawing/2014/main" id="{3761FA84-21E4-807D-0940-731EE4D6A7EB}"/>
+              </a:ext>
+            </a:extLst>
+          </p:cNvPr>
+          <p:cNvSpPr txBox="1"/>
+          <p:nvPr/>
+        </p:nvSpPr>
+        <p:spPr>
+          <a:xfrm>
+            <a:off x="1401289" y="5536415"/>
+            <a:ext cx="1377741" cy="523220"/>
+          </a:xfrm>
+          <a:prstGeom prst="rect">
+            <a:avLst/>
+          </a:prstGeom>
+          <a:noFill/>
+        </p:spPr>
+        <p:txBody>
+          <a:bodyPr wrap="square" rtlCol="0">
+            <a:spAutoFit/>
+          </a:bodyPr>
+          <a:lstStyle/>
+          <a:p>
+            <a:pPr algn="ctr"/>
+            <a:r>
+              <a:rPr lang="en-US" sz="1400" dirty="0"/>
+              <a:t>Functional characterization</a:t>
+            </a:r>
+          </a:p>
+        </p:txBody>
+      </p:sp>
+      <p:sp>
+        <p:nvSpPr>
+          <p:cNvPr id="29" name="TextBox 28">
+            <a:extLst>
+              <a:ext uri="{FF2B5EF4-FFF2-40B4-BE49-F238E27FC236}">
+                <a16:creationId xmlns:a16="http://schemas.microsoft.com/office/drawing/2014/main" id="{C1A5888D-324A-5F10-D3A2-E01C32C8BE93}"/>
+              </a:ext>
+            </a:extLst>
+          </p:cNvPr>
+          <p:cNvSpPr txBox="1"/>
+          <p:nvPr/>
+        </p:nvSpPr>
+        <p:spPr>
+          <a:xfrm>
+            <a:off x="2051859" y="217678"/>
+            <a:ext cx="5872570" cy="400110"/>
+          </a:xfrm>
+          <a:prstGeom prst="rect">
+            <a:avLst/>
+          </a:prstGeom>
+          <a:noFill/>
         </p:spPr>
         <p:txBody>
           <a:bodyPr wrap="none" rtlCol="0">
@@ -4051,64 +4297,16 @@
           <a:lstStyle/>
           <a:p>
             <a:r>
-              <a:rPr lang="en-US" dirty="0"/>
-              <a:t>TGI-4 </a:t>
-            </a:r>
-            <a:r>
-              <a:rPr lang="en-US" dirty="0" err="1"/>
-              <a:t>motA</a:t>
-            </a:r>
-            <a:endParaRPr lang="en-US" dirty="0"/>
-          </a:p>
-        </p:txBody>
-      </p:sp>
-      <p:cxnSp>
-        <p:nvCxnSpPr>
-          <p:cNvPr id="16" name="Straight Connector 15">
-            <a:extLst>
-              <a:ext uri="{FF2B5EF4-FFF2-40B4-BE49-F238E27FC236}">
-                <a16:creationId xmlns:a16="http://schemas.microsoft.com/office/drawing/2014/main" id="{9CF08776-8704-974E-A3B0-0EAC073EFEA2}"/>
-              </a:ext>
-            </a:extLst>
-          </p:cNvPr>
-          <p:cNvCxnSpPr>
-            <a:endCxn id="14" idx="1"/>
-          </p:cNvCxnSpPr>
-          <p:nvPr/>
-        </p:nvCxnSpPr>
-        <p:spPr>
-          <a:xfrm flipV="1">
-            <a:off x="7976938" y="1818468"/>
-            <a:ext cx="604091" cy="1"/>
-          </a:xfrm>
-          <a:prstGeom prst="line">
-            <a:avLst/>
-          </a:prstGeom>
-          <a:ln w="57150">
-            <a:solidFill>
-              <a:srgbClr val="FA04EF"/>
-            </a:solidFill>
-          </a:ln>
-        </p:spPr>
-        <p:style>
-          <a:lnRef idx="1">
-            <a:schemeClr val="accent1"/>
-          </a:lnRef>
-          <a:fillRef idx="0">
-            <a:schemeClr val="accent1"/>
-          </a:fillRef>
-          <a:effectRef idx="0">
-            <a:schemeClr val="accent1"/>
-          </a:effectRef>
-          <a:fontRef idx="minor">
-            <a:schemeClr val="tx1"/>
-          </a:fontRef>
-        </p:style>
-      </p:cxnSp>
+              <a:rPr lang="en-US" sz="2000" dirty="0"/>
+              <a:t>Overview: Structural variation in the light of phylogeny</a:t>
+            </a:r>
+          </a:p>
+        </p:txBody>
+      </p:sp>
     </p:spTree>
     <p:extLst>
       <p:ext uri="{BB962C8B-B14F-4D97-AF65-F5344CB8AC3E}">
-        <p14:creationId xmlns:p14="http://schemas.microsoft.com/office/powerpoint/2010/main" val="1306391502"/>
+        <p14:creationId xmlns:p14="http://schemas.microsoft.com/office/powerpoint/2010/main" val="4035305287"/>
       </p:ext>
     </p:extLst>
   </p:cSld>
@@ -4178,8 +4376,8 @@
         </p:nvSpPr>
         <p:spPr>
           <a:xfrm>
-            <a:off x="1527263" y="1252134"/>
-            <a:ext cx="2431948" cy="369332"/>
+            <a:off x="161995" y="3629"/>
+            <a:ext cx="3797969" cy="3139321"/>
           </a:xfrm>
           <a:prstGeom prst="rect">
             <a:avLst/>
@@ -4192,19 +4390,75 @@
           </a:ln>
         </p:spPr>
         <p:txBody>
-          <a:bodyPr wrap="none" rtlCol="0">
+          <a:bodyPr wrap="square" rtlCol="0">
             <a:spAutoFit/>
           </a:bodyPr>
           <a:lstStyle/>
           <a:p>
             <a:r>
               <a:rPr lang="en-US" dirty="0"/>
+              <a:t>“FIT” or “FITO” (FIT=flagellar ion transporter oligomer)</a:t>
+            </a:r>
+            <a:br>
+              <a:rPr lang="en-US" dirty="0"/>
+            </a:br>
+            <a:r>
+              <a:rPr lang="en-US" dirty="0"/>
               <a:t>Flagellar proteins: </a:t>
             </a:r>
             <a:r>
               <a:rPr lang="en-US" dirty="0" err="1"/>
               <a:t>motA</a:t>
             </a:r>
+            <a:endParaRPr lang="en-US" dirty="0"/>
+          </a:p>
+          <a:p>
+            <a:endParaRPr lang="en-US" dirty="0"/>
+          </a:p>
+          <a:p>
+            <a:r>
+              <a:rPr lang="en-US" dirty="0"/>
+              <a:t>Other “MotAB” motors:</a:t>
+            </a:r>
+          </a:p>
+          <a:p>
+            <a:r>
+              <a:rPr lang="en-US" dirty="0" err="1"/>
+              <a:t>PomAB</a:t>
+            </a:r>
+            <a:r>
+              <a:rPr lang="en-US" dirty="0"/>
+              <a:t> (Polar motors, usually sodium/Na+ powered)</a:t>
+            </a:r>
+          </a:p>
+          <a:p>
+            <a:r>
+              <a:rPr lang="en-US" dirty="0" err="1"/>
+              <a:t>LafTU</a:t>
+            </a:r>
+            <a:r>
+              <a:rPr lang="en-US" dirty="0"/>
+              <a:t> (Lateral flagellar)</a:t>
+            </a:r>
+          </a:p>
+          <a:p>
+            <a:r>
+              <a:rPr lang="en-US" dirty="0" err="1"/>
+              <a:t>MotCD</a:t>
+            </a:r>
+            <a:endParaRPr lang="en-US" dirty="0"/>
+          </a:p>
+          <a:p>
+            <a:r>
+              <a:rPr lang="en-US" dirty="0" err="1"/>
+              <a:t>MotPS</a:t>
+            </a:r>
+            <a:r>
+              <a:rPr lang="en-US" dirty="0"/>
+              <a:t> (high PH motors I think)</a:t>
+            </a:r>
+          </a:p>
+          <a:p>
             <a:endParaRPr lang="en-US" dirty="0"/>
           </a:p>
         </p:txBody>
@@ -4328,7 +4582,7 @@
         <p:spPr>
           <a:xfrm>
             <a:off x="8493049" y="882802"/>
-            <a:ext cx="1454309" cy="369332"/>
+            <a:ext cx="1250407" cy="369332"/>
           </a:xfrm>
           <a:prstGeom prst="rect">
             <a:avLst/>
@@ -4348,7 +4602,7 @@
           <a:p>
             <a:r>
               <a:rPr lang="en-US" dirty="0"/>
-              <a:t>Crassus </a:t>
+              <a:t>TGI-5 </a:t>
             </a:r>
             <a:r>
               <a:rPr lang="en-US" dirty="0" err="1"/>
@@ -4552,8 +4806,8 @@
         </p:nvSpPr>
         <p:spPr>
           <a:xfrm>
-            <a:off x="1467103" y="4271697"/>
-            <a:ext cx="2341731" cy="646331"/>
+            <a:off x="69669" y="3067227"/>
+            <a:ext cx="3739164" cy="3693319"/>
           </a:xfrm>
           <a:prstGeom prst="rect">
             <a:avLst/>
@@ -4566,6 +4820,180 @@
           </a:ln>
         </p:spPr>
         <p:txBody>
+          <a:bodyPr wrap="square" rtlCol="0">
+            <a:spAutoFit/>
+          </a:bodyPr>
+          <a:lstStyle/>
+          <a:p>
+            <a:r>
+              <a:rPr lang="en-US" dirty="0"/>
+              <a:t>”GIT” or “GITO” (General Ion transporter oligomer)</a:t>
+            </a:r>
+          </a:p>
+          <a:p>
+            <a:r>
+              <a:rPr lang="en-US" dirty="0"/>
+              <a:t>Or UNFIT: “(mostly) Uncharacterized Nonflagellar relatives of Flagellar Ion Transporters”</a:t>
+            </a:r>
+          </a:p>
+          <a:p>
+            <a:endParaRPr lang="en-US" dirty="0"/>
+          </a:p>
+          <a:p>
+            <a:r>
+              <a:rPr lang="en-US" dirty="0"/>
+              <a:t>Non-flagellar proteins: </a:t>
+            </a:r>
+          </a:p>
+          <a:p>
+            <a:r>
+              <a:rPr lang="en-US" dirty="0"/>
+              <a:t>ExbBD, TolQR (ion transporters)</a:t>
+            </a:r>
+          </a:p>
+          <a:p>
+            <a:r>
+              <a:rPr lang="en-US" dirty="0" err="1"/>
+              <a:t>AglRS</a:t>
+            </a:r>
+            <a:r>
+              <a:rPr lang="en-US" dirty="0"/>
+              <a:t> (Adventitious Gliding in </a:t>
+            </a:r>
+            <a:r>
+              <a:rPr lang="en-US" i="1" dirty="0"/>
+              <a:t>Myxococcus</a:t>
+            </a:r>
+            <a:r>
+              <a:rPr lang="en-US" dirty="0"/>
+              <a:t>)</a:t>
+            </a:r>
+          </a:p>
+          <a:p>
+            <a:endParaRPr lang="en-US" dirty="0"/>
+          </a:p>
+          <a:p>
+            <a:r>
+              <a:rPr lang="en-US" dirty="0"/>
+              <a:t>AQB = Nick Matzke’s shorthand for “MotA/TolQ/ExbB superfamily”</a:t>
+            </a:r>
+          </a:p>
+        </p:txBody>
+      </p:sp>
+      <p:cxnSp>
+        <p:nvCxnSpPr>
+          <p:cNvPr id="19" name="Straight Connector 18">
+            <a:extLst>
+              <a:ext uri="{FF2B5EF4-FFF2-40B4-BE49-F238E27FC236}">
+                <a16:creationId xmlns:a16="http://schemas.microsoft.com/office/drawing/2014/main" id="{B8D30D82-A5B3-CC7C-B6AF-07E180DF2EE0}"/>
+              </a:ext>
+            </a:extLst>
+          </p:cNvPr>
+          <p:cNvCxnSpPr>
+            <a:cxnSpLocks/>
+          </p:cNvCxnSpPr>
+          <p:nvPr/>
+        </p:nvCxnSpPr>
+        <p:spPr>
+          <a:xfrm>
+            <a:off x="3808834" y="4903290"/>
+            <a:ext cx="366123" cy="1510210"/>
+          </a:xfrm>
+          <a:prstGeom prst="line">
+            <a:avLst/>
+          </a:prstGeom>
+          <a:ln w="38100">
+            <a:solidFill>
+              <a:srgbClr val="0EE0CE"/>
+            </a:solidFill>
+          </a:ln>
+        </p:spPr>
+        <p:style>
+          <a:lnRef idx="1">
+            <a:schemeClr val="accent1"/>
+          </a:lnRef>
+          <a:fillRef idx="0">
+            <a:schemeClr val="accent1"/>
+          </a:fillRef>
+          <a:effectRef idx="0">
+            <a:schemeClr val="accent1"/>
+          </a:effectRef>
+          <a:fontRef idx="minor">
+            <a:schemeClr val="tx1"/>
+          </a:fontRef>
+        </p:style>
+      </p:cxnSp>
+      <p:cxnSp>
+        <p:nvCxnSpPr>
+          <p:cNvPr id="21" name="Straight Connector 20">
+            <a:extLst>
+              <a:ext uri="{FF2B5EF4-FFF2-40B4-BE49-F238E27FC236}">
+                <a16:creationId xmlns:a16="http://schemas.microsoft.com/office/drawing/2014/main" id="{A656B789-9512-1AA9-880B-EDBC61702FF2}"/>
+              </a:ext>
+            </a:extLst>
+          </p:cNvPr>
+          <p:cNvCxnSpPr>
+            <a:cxnSpLocks/>
+          </p:cNvCxnSpPr>
+          <p:nvPr/>
+        </p:nvCxnSpPr>
+        <p:spPr>
+          <a:xfrm flipV="1">
+            <a:off x="3800457" y="2346158"/>
+            <a:ext cx="366479" cy="1925539"/>
+          </a:xfrm>
+          <a:prstGeom prst="line">
+            <a:avLst/>
+          </a:prstGeom>
+          <a:ln w="38100">
+            <a:solidFill>
+              <a:srgbClr val="0EE0CE"/>
+            </a:solidFill>
+          </a:ln>
+        </p:spPr>
+        <p:style>
+          <a:lnRef idx="1">
+            <a:schemeClr val="accent1"/>
+          </a:lnRef>
+          <a:fillRef idx="0">
+            <a:schemeClr val="accent1"/>
+          </a:fillRef>
+          <a:effectRef idx="0">
+            <a:schemeClr val="accent1"/>
+          </a:effectRef>
+          <a:fontRef idx="minor">
+            <a:schemeClr val="tx1"/>
+          </a:fontRef>
+        </p:style>
+      </p:cxnSp>
+      <p:sp>
+        <p:nvSpPr>
+          <p:cNvPr id="14" name="TextBox 13">
+            <a:extLst>
+              <a:ext uri="{FF2B5EF4-FFF2-40B4-BE49-F238E27FC236}">
+                <a16:creationId xmlns:a16="http://schemas.microsoft.com/office/drawing/2014/main" id="{5C5258CB-A938-5448-AC7B-22C248D59D80}"/>
+              </a:ext>
+            </a:extLst>
+          </p:cNvPr>
+          <p:cNvSpPr txBox="1"/>
+          <p:nvPr/>
+        </p:nvSpPr>
+        <p:spPr>
+          <a:xfrm>
+            <a:off x="8581029" y="1633802"/>
+            <a:ext cx="1250407" cy="369332"/>
+          </a:xfrm>
+          <a:prstGeom prst="rect">
+            <a:avLst/>
+          </a:prstGeom>
+          <a:noFill/>
+          <a:ln w="28575">
+            <a:solidFill>
+              <a:srgbClr val="FA04EF"/>
+            </a:solidFill>
+          </a:ln>
+        </p:spPr>
+        <p:txBody>
           <a:bodyPr wrap="none" rtlCol="0">
             <a:spAutoFit/>
           </a:bodyPr>
@@ -4573,25 +5001,534 @@
           <a:p>
             <a:r>
               <a:rPr lang="en-US" dirty="0"/>
+              <a:t>TGI-4 </a:t>
+            </a:r>
+            <a:r>
+              <a:rPr lang="en-US" dirty="0" err="1"/>
+              <a:t>motA</a:t>
+            </a:r>
+            <a:endParaRPr lang="en-US" dirty="0"/>
+          </a:p>
+        </p:txBody>
+      </p:sp>
+      <p:cxnSp>
+        <p:nvCxnSpPr>
+          <p:cNvPr id="16" name="Straight Connector 15">
+            <a:extLst>
+              <a:ext uri="{FF2B5EF4-FFF2-40B4-BE49-F238E27FC236}">
+                <a16:creationId xmlns:a16="http://schemas.microsoft.com/office/drawing/2014/main" id="{9CF08776-8704-974E-A3B0-0EAC073EFEA2}"/>
+              </a:ext>
+            </a:extLst>
+          </p:cNvPr>
+          <p:cNvCxnSpPr>
+            <a:endCxn id="14" idx="1"/>
+          </p:cNvCxnSpPr>
+          <p:nvPr/>
+        </p:nvCxnSpPr>
+        <p:spPr>
+          <a:xfrm flipV="1">
+            <a:off x="7976938" y="1818468"/>
+            <a:ext cx="604091" cy="1"/>
+          </a:xfrm>
+          <a:prstGeom prst="line">
+            <a:avLst/>
+          </a:prstGeom>
+          <a:ln w="57150">
+            <a:solidFill>
+              <a:srgbClr val="FA04EF"/>
+            </a:solidFill>
+          </a:ln>
+        </p:spPr>
+        <p:style>
+          <a:lnRef idx="1">
+            <a:schemeClr val="accent1"/>
+          </a:lnRef>
+          <a:fillRef idx="0">
+            <a:schemeClr val="accent1"/>
+          </a:fillRef>
+          <a:effectRef idx="0">
+            <a:schemeClr val="accent1"/>
+          </a:effectRef>
+          <a:fontRef idx="minor">
+            <a:schemeClr val="tx1"/>
+          </a:fontRef>
+        </p:style>
+      </p:cxnSp>
+    </p:spTree>
+    <p:extLst>
+      <p:ext uri="{BB962C8B-B14F-4D97-AF65-F5344CB8AC3E}">
+        <p14:creationId xmlns:p14="http://schemas.microsoft.com/office/powerpoint/2010/main" val="1306391502"/>
+      </p:ext>
+    </p:extLst>
+  </p:cSld>
+  <p:clrMapOvr>
+    <a:masterClrMapping/>
+  </p:clrMapOvr>
+</p:sld>
+</file>
+
+<file path=ppt/slides/slide3.xml><?xml version="1.0" encoding="utf-8"?>
+<p:sld xmlns:a="http://schemas.openxmlformats.org/drawingml/2006/main" xmlns:r="http://schemas.openxmlformats.org/officeDocument/2006/relationships" xmlns:p="http://schemas.openxmlformats.org/presentationml/2006/main">
+  <p:cSld>
+    <p:spTree>
+      <p:nvGrpSpPr>
+        <p:cNvPr id="1" name=""/>
+        <p:cNvGrpSpPr/>
+        <p:nvPr/>
+      </p:nvGrpSpPr>
+      <p:grpSpPr>
+        <a:xfrm>
+          <a:off x="0" y="0"/>
+          <a:ext cx="0" cy="0"/>
+          <a:chOff x="0" y="0"/>
+          <a:chExt cx="0" cy="0"/>
+        </a:xfrm>
+      </p:grpSpPr>
+      <p:pic>
+        <p:nvPicPr>
+          <p:cNvPr id="5" name="Picture 4" descr="A screen shot of a computer screen&#10;&#10;Description automatically generated">
+            <a:extLst>
+              <a:ext uri="{FF2B5EF4-FFF2-40B4-BE49-F238E27FC236}">
+                <a16:creationId xmlns:a16="http://schemas.microsoft.com/office/drawing/2014/main" id="{EEDADE76-E2AC-ED6A-A6EE-B6ABFD4C906B}"/>
+              </a:ext>
+            </a:extLst>
+          </p:cNvPr>
+          <p:cNvPicPr>
+            <a:picLocks noChangeAspect="1"/>
+          </p:cNvPicPr>
+          <p:nvPr/>
+        </p:nvPicPr>
+        <p:blipFill rotWithShape="1">
+          <a:blip r:embed="rId2"/>
+          <a:srcRect r="23589"/>
+          <a:stretch/>
+        </p:blipFill>
+        <p:spPr>
+          <a:xfrm>
+            <a:off x="4278982" y="787400"/>
+            <a:ext cx="3609975" cy="5626100"/>
+          </a:xfrm>
+          <a:prstGeom prst="rect">
+            <a:avLst/>
+          </a:prstGeom>
+        </p:spPr>
+      </p:pic>
+      <p:sp>
+        <p:nvSpPr>
+          <p:cNvPr id="6" name="TextBox 5">
+            <a:extLst>
+              <a:ext uri="{FF2B5EF4-FFF2-40B4-BE49-F238E27FC236}">
+                <a16:creationId xmlns:a16="http://schemas.microsoft.com/office/drawing/2014/main" id="{C0DC1A5D-B6BE-A4CE-A1D2-1BA319AEB147}"/>
+              </a:ext>
+            </a:extLst>
+          </p:cNvPr>
+          <p:cNvSpPr txBox="1"/>
+          <p:nvPr/>
+        </p:nvSpPr>
+        <p:spPr>
+          <a:xfrm>
+            <a:off x="1527263" y="1252134"/>
+            <a:ext cx="2431948" cy="369332"/>
+          </a:xfrm>
+          <a:prstGeom prst="rect">
+            <a:avLst/>
+          </a:prstGeom>
+          <a:noFill/>
+          <a:ln w="28575">
+            <a:solidFill>
+              <a:srgbClr val="FF0000"/>
+            </a:solidFill>
+          </a:ln>
+        </p:spPr>
+        <p:txBody>
+          <a:bodyPr wrap="none" rtlCol="0">
+            <a:spAutoFit/>
+          </a:bodyPr>
+          <a:lstStyle/>
+          <a:p>
+            <a:r>
+              <a:rPr lang="en-US" dirty="0"/>
+              <a:t>Flagellar proteins: </a:t>
+            </a:r>
+            <a:r>
+              <a:rPr lang="en-US" dirty="0" err="1"/>
+              <a:t>motA</a:t>
+            </a:r>
+            <a:endParaRPr lang="en-US" dirty="0"/>
+          </a:p>
+        </p:txBody>
+      </p:sp>
+      <p:sp>
+        <p:nvSpPr>
+          <p:cNvPr id="7" name="Rectangle 6">
+            <a:extLst>
+              <a:ext uri="{FF2B5EF4-FFF2-40B4-BE49-F238E27FC236}">
+                <a16:creationId xmlns:a16="http://schemas.microsoft.com/office/drawing/2014/main" id="{1ABF8D60-7F6D-4210-5B42-F29B6428A19F}"/>
+              </a:ext>
+            </a:extLst>
+          </p:cNvPr>
+          <p:cNvSpPr/>
+          <p:nvPr/>
+        </p:nvSpPr>
+        <p:spPr>
+          <a:xfrm>
+            <a:off x="4174958" y="685800"/>
+            <a:ext cx="3801980" cy="1660358"/>
+          </a:xfrm>
+          <a:prstGeom prst="rect">
+            <a:avLst/>
+          </a:prstGeom>
+          <a:noFill/>
+          <a:ln w="38100">
+            <a:solidFill>
+              <a:srgbClr val="FF0000"/>
+            </a:solidFill>
+          </a:ln>
+        </p:spPr>
+        <p:style>
+          <a:lnRef idx="2">
+            <a:schemeClr val="accent1">
+              <a:shade val="15000"/>
+            </a:schemeClr>
+          </a:lnRef>
+          <a:fillRef idx="1">
+            <a:schemeClr val="accent1"/>
+          </a:fillRef>
+          <a:effectRef idx="0">
+            <a:schemeClr val="accent1"/>
+          </a:effectRef>
+          <a:fontRef idx="minor">
+            <a:schemeClr val="lt1"/>
+          </a:fontRef>
+        </p:style>
+        <p:txBody>
+          <a:bodyPr rtlCol="0" anchor="ctr"/>
+          <a:lstStyle/>
+          <a:p>
+            <a:pPr algn="ctr"/>
+            <a:endParaRPr lang="en-US"/>
+          </a:p>
+        </p:txBody>
+      </p:sp>
+      <p:sp>
+        <p:nvSpPr>
+          <p:cNvPr id="8" name="Rectangle 7">
+            <a:extLst>
+              <a:ext uri="{FF2B5EF4-FFF2-40B4-BE49-F238E27FC236}">
+                <a16:creationId xmlns:a16="http://schemas.microsoft.com/office/drawing/2014/main" id="{5D24BF25-9F20-176E-3189-96A2499A091A}"/>
+              </a:ext>
+            </a:extLst>
+          </p:cNvPr>
+          <p:cNvSpPr/>
+          <p:nvPr/>
+        </p:nvSpPr>
+        <p:spPr>
+          <a:xfrm>
+            <a:off x="4278982" y="787400"/>
+            <a:ext cx="3609976" cy="560137"/>
+          </a:xfrm>
+          <a:prstGeom prst="rect">
+            <a:avLst/>
+          </a:prstGeom>
+          <a:noFill/>
+          <a:ln w="38100">
+            <a:solidFill>
+              <a:srgbClr val="FA04EF"/>
+            </a:solidFill>
+          </a:ln>
+        </p:spPr>
+        <p:style>
+          <a:lnRef idx="2">
+            <a:schemeClr val="accent1">
+              <a:shade val="15000"/>
+            </a:schemeClr>
+          </a:lnRef>
+          <a:fillRef idx="1">
+            <a:schemeClr val="accent1"/>
+          </a:fillRef>
+          <a:effectRef idx="0">
+            <a:schemeClr val="accent1"/>
+          </a:effectRef>
+          <a:fontRef idx="minor">
+            <a:schemeClr val="lt1"/>
+          </a:fontRef>
+        </p:style>
+        <p:txBody>
+          <a:bodyPr rtlCol="0" anchor="ctr"/>
+          <a:lstStyle/>
+          <a:p>
+            <a:pPr algn="ctr"/>
+            <a:endParaRPr lang="en-US"/>
+          </a:p>
+        </p:txBody>
+      </p:sp>
+      <p:sp>
+        <p:nvSpPr>
+          <p:cNvPr id="9" name="TextBox 8">
+            <a:extLst>
+              <a:ext uri="{FF2B5EF4-FFF2-40B4-BE49-F238E27FC236}">
+                <a16:creationId xmlns:a16="http://schemas.microsoft.com/office/drawing/2014/main" id="{BB346409-4280-9051-161D-A5B0906838B2}"/>
+              </a:ext>
+            </a:extLst>
+          </p:cNvPr>
+          <p:cNvSpPr txBox="1"/>
+          <p:nvPr/>
+        </p:nvSpPr>
+        <p:spPr>
+          <a:xfrm>
+            <a:off x="8493049" y="882802"/>
+            <a:ext cx="1454309" cy="369332"/>
+          </a:xfrm>
+          <a:prstGeom prst="rect">
+            <a:avLst/>
+          </a:prstGeom>
+          <a:noFill/>
+          <a:ln w="28575">
+            <a:solidFill>
+              <a:srgbClr val="FA04EF"/>
+            </a:solidFill>
+          </a:ln>
+        </p:spPr>
+        <p:txBody>
+          <a:bodyPr wrap="none" rtlCol="0">
+            <a:spAutoFit/>
+          </a:bodyPr>
+          <a:lstStyle/>
+          <a:p>
+            <a:r>
+              <a:rPr lang="en-US" dirty="0"/>
+              <a:t>Crassus </a:t>
+            </a:r>
+            <a:r>
+              <a:rPr lang="en-US" dirty="0" err="1"/>
+              <a:t>motA</a:t>
+            </a:r>
+            <a:endParaRPr lang="en-US" dirty="0"/>
+          </a:p>
+        </p:txBody>
+      </p:sp>
+      <p:cxnSp>
+        <p:nvCxnSpPr>
+          <p:cNvPr id="11" name="Straight Connector 10">
+            <a:extLst>
+              <a:ext uri="{FF2B5EF4-FFF2-40B4-BE49-F238E27FC236}">
+                <a16:creationId xmlns:a16="http://schemas.microsoft.com/office/drawing/2014/main" id="{D1D7E7AC-BBD7-7615-B75D-E1BAEF2C5EE5}"/>
+              </a:ext>
+            </a:extLst>
+          </p:cNvPr>
+          <p:cNvCxnSpPr>
+            <a:stCxn id="8" idx="3"/>
+            <a:endCxn id="9" idx="1"/>
+          </p:cNvCxnSpPr>
+          <p:nvPr/>
+        </p:nvCxnSpPr>
+        <p:spPr>
+          <a:xfrm flipV="1">
+            <a:off x="7888958" y="1067468"/>
+            <a:ext cx="604091" cy="1"/>
+          </a:xfrm>
+          <a:prstGeom prst="line">
+            <a:avLst/>
+          </a:prstGeom>
+          <a:ln w="57150">
+            <a:solidFill>
+              <a:srgbClr val="FA04EF"/>
+            </a:solidFill>
+          </a:ln>
+        </p:spPr>
+        <p:style>
+          <a:lnRef idx="1">
+            <a:schemeClr val="accent1"/>
+          </a:lnRef>
+          <a:fillRef idx="0">
+            <a:schemeClr val="accent1"/>
+          </a:fillRef>
+          <a:effectRef idx="0">
+            <a:schemeClr val="accent1"/>
+          </a:effectRef>
+          <a:fontRef idx="minor">
+            <a:schemeClr val="tx1"/>
+          </a:fontRef>
+        </p:style>
+      </p:cxnSp>
+      <p:cxnSp>
+        <p:nvCxnSpPr>
+          <p:cNvPr id="13" name="Straight Connector 12">
+            <a:extLst>
+              <a:ext uri="{FF2B5EF4-FFF2-40B4-BE49-F238E27FC236}">
+                <a16:creationId xmlns:a16="http://schemas.microsoft.com/office/drawing/2014/main" id="{ACB4563F-FB8F-0BE6-2DA7-50E4E838F4C4}"/>
+              </a:ext>
+            </a:extLst>
+          </p:cNvPr>
+          <p:cNvCxnSpPr>
+            <a:cxnSpLocks/>
+          </p:cNvCxnSpPr>
+          <p:nvPr/>
+        </p:nvCxnSpPr>
+        <p:spPr>
+          <a:xfrm flipV="1">
+            <a:off x="3959965" y="685800"/>
+            <a:ext cx="214993" cy="566334"/>
+          </a:xfrm>
+          <a:prstGeom prst="line">
+            <a:avLst/>
+          </a:prstGeom>
+          <a:ln w="38100">
+            <a:solidFill>
+              <a:srgbClr val="FF0000"/>
+            </a:solidFill>
+          </a:ln>
+        </p:spPr>
+        <p:style>
+          <a:lnRef idx="1">
+            <a:schemeClr val="accent1"/>
+          </a:lnRef>
+          <a:fillRef idx="0">
+            <a:schemeClr val="accent1"/>
+          </a:fillRef>
+          <a:effectRef idx="0">
+            <a:schemeClr val="accent1"/>
+          </a:effectRef>
+          <a:fontRef idx="minor">
+            <a:schemeClr val="tx1"/>
+          </a:fontRef>
+        </p:style>
+      </p:cxnSp>
+      <p:cxnSp>
+        <p:nvCxnSpPr>
+          <p:cNvPr id="15" name="Straight Connector 14">
+            <a:extLst>
+              <a:ext uri="{FF2B5EF4-FFF2-40B4-BE49-F238E27FC236}">
+                <a16:creationId xmlns:a16="http://schemas.microsoft.com/office/drawing/2014/main" id="{3A106FB7-9294-6240-04A0-A73D0081CB16}"/>
+              </a:ext>
+            </a:extLst>
+          </p:cNvPr>
+          <p:cNvCxnSpPr/>
+          <p:nvPr/>
+        </p:nvCxnSpPr>
+        <p:spPr>
+          <a:xfrm>
+            <a:off x="3959965" y="1621466"/>
+            <a:ext cx="214993" cy="724692"/>
+          </a:xfrm>
+          <a:prstGeom prst="line">
+            <a:avLst/>
+          </a:prstGeom>
+          <a:ln w="38100">
+            <a:solidFill>
+              <a:srgbClr val="FF0000"/>
+            </a:solidFill>
+          </a:ln>
+        </p:spPr>
+        <p:style>
+          <a:lnRef idx="1">
+            <a:schemeClr val="accent1"/>
+          </a:lnRef>
+          <a:fillRef idx="0">
+            <a:schemeClr val="accent1"/>
+          </a:fillRef>
+          <a:effectRef idx="0">
+            <a:schemeClr val="accent1"/>
+          </a:effectRef>
+          <a:fontRef idx="minor">
+            <a:schemeClr val="tx1"/>
+          </a:fontRef>
+        </p:style>
+      </p:cxnSp>
+      <p:sp>
+        <p:nvSpPr>
+          <p:cNvPr id="17" name="Rectangle 16">
+            <a:extLst>
+              <a:ext uri="{FF2B5EF4-FFF2-40B4-BE49-F238E27FC236}">
+                <a16:creationId xmlns:a16="http://schemas.microsoft.com/office/drawing/2014/main" id="{72F2E8B1-3855-15A3-38D6-5C99EA6988D3}"/>
+              </a:ext>
+            </a:extLst>
+          </p:cNvPr>
+          <p:cNvSpPr/>
+          <p:nvPr/>
+        </p:nvSpPr>
+        <p:spPr>
+          <a:xfrm>
+            <a:off x="4174958" y="2377240"/>
+            <a:ext cx="3801980" cy="4036260"/>
+          </a:xfrm>
+          <a:prstGeom prst="rect">
+            <a:avLst/>
+          </a:prstGeom>
+          <a:noFill/>
+          <a:ln w="38100">
+            <a:solidFill>
+              <a:srgbClr val="0EE0CE"/>
+            </a:solidFill>
+          </a:ln>
+        </p:spPr>
+        <p:style>
+          <a:lnRef idx="2">
+            <a:schemeClr val="accent1">
+              <a:shade val="15000"/>
+            </a:schemeClr>
+          </a:lnRef>
+          <a:fillRef idx="1">
+            <a:schemeClr val="accent1"/>
+          </a:fillRef>
+          <a:effectRef idx="0">
+            <a:schemeClr val="accent1"/>
+          </a:effectRef>
+          <a:fontRef idx="minor">
+            <a:schemeClr val="lt1"/>
+          </a:fontRef>
+        </p:style>
+        <p:txBody>
+          <a:bodyPr rtlCol="0" anchor="ctr"/>
+          <a:lstStyle/>
+          <a:p>
+            <a:pPr algn="ctr"/>
+            <a:endParaRPr lang="en-US"/>
+          </a:p>
+        </p:txBody>
+      </p:sp>
+      <p:sp>
+        <p:nvSpPr>
+          <p:cNvPr id="18" name="TextBox 17">
+            <a:extLst>
+              <a:ext uri="{FF2B5EF4-FFF2-40B4-BE49-F238E27FC236}">
+                <a16:creationId xmlns:a16="http://schemas.microsoft.com/office/drawing/2014/main" id="{B58F513E-012C-6705-DD27-DAE4B53152DF}"/>
+              </a:ext>
+            </a:extLst>
+          </p:cNvPr>
+          <p:cNvSpPr txBox="1"/>
+          <p:nvPr/>
+        </p:nvSpPr>
+        <p:spPr>
+          <a:xfrm>
+            <a:off x="1467103" y="4271697"/>
+            <a:ext cx="2341731" cy="646331"/>
+          </a:xfrm>
+          <a:prstGeom prst="rect">
+            <a:avLst/>
+          </a:prstGeom>
+          <a:noFill/>
+          <a:ln w="28575">
+            <a:solidFill>
+              <a:srgbClr val="0EE0CE"/>
+            </a:solidFill>
+          </a:ln>
+        </p:spPr>
+        <p:txBody>
+          <a:bodyPr wrap="none" rtlCol="0">
+            <a:spAutoFit/>
+          </a:bodyPr>
+          <a:lstStyle/>
+          <a:p>
+            <a:r>
+              <a:rPr lang="en-US" dirty="0"/>
               <a:t>Non-flagellar proteins: </a:t>
             </a:r>
           </a:p>
           <a:p>
             <a:r>
-              <a:rPr lang="en-US" dirty="0" err="1"/>
-              <a:t>ExbB</a:t>
-            </a:r>
-            <a:r>
               <a:rPr lang="en-US" dirty="0"/>
-              <a:t>, </a:t>
-            </a:r>
-            <a:r>
-              <a:rPr lang="en-US" dirty="0" err="1"/>
-              <a:t>TolQ</a:t>
-            </a:r>
-            <a:r>
-              <a:rPr lang="en-US" dirty="0"/>
-              <a:t>, AQB</a:t>
+              <a:t>ExbB, TolQ, AQB</a:t>
             </a:r>
           </a:p>
         </p:txBody>

</xml_diff>